<commit_message>
add slide for java future
</commit_message>
<xml_diff>
--- a/presentations/java_multiapi_gql.pptx
+++ b/presentations/java_multiapi_gql.pptx
@@ -5,10 +5,10 @@
     <p:sldMasterId id="2147483662" r:id="rId1"/>
   </p:sldMasterIdLst>
   <p:notesMasterIdLst>
-    <p:notesMasterId r:id="rId12"/>
+    <p:notesMasterId r:id="rId16"/>
   </p:notesMasterIdLst>
   <p:handoutMasterIdLst>
-    <p:handoutMasterId r:id="rId13"/>
+    <p:handoutMasterId r:id="rId17"/>
   </p:handoutMasterIdLst>
   <p:sldIdLst>
     <p:sldId id="299" r:id="rId2"/>
@@ -21,6 +21,10 @@
     <p:sldId id="345" r:id="rId9"/>
     <p:sldId id="346" r:id="rId10"/>
     <p:sldId id="348" r:id="rId11"/>
+    <p:sldId id="353" r:id="rId12"/>
+    <p:sldId id="349" r:id="rId13"/>
+    <p:sldId id="350" r:id="rId14"/>
+    <p:sldId id="352" r:id="rId15"/>
   </p:sldIdLst>
   <p:sldSz cx="12192000" cy="6858000"/>
   <p:notesSz cx="6858000" cy="9144000"/>
@@ -186,7 +190,7 @@
           <p:cNvPr id="2" name="Header Placeholder 1">
             <a:extLst>
               <a:ext uri="{FF2B5EF4-FFF2-40B4-BE49-F238E27FC236}">
-                <a16:creationId xmlns:a16="http://schemas.microsoft.com/office/drawing/2014/main" id="{D5308970-846F-4784-9EEF-B73053E1BCC3}"/>
+                <a16:creationId xmlns="" xmlns:a16="http://schemas.microsoft.com/office/drawing/2014/main" id="{D5308970-846F-4784-9EEF-B73053E1BCC3}"/>
               </a:ext>
             </a:extLst>
           </p:cNvPr>
@@ -223,7 +227,7 @@
           <p:cNvPr id="3" name="Date Placeholder 2">
             <a:extLst>
               <a:ext uri="{FF2B5EF4-FFF2-40B4-BE49-F238E27FC236}">
-                <a16:creationId xmlns:a16="http://schemas.microsoft.com/office/drawing/2014/main" id="{5EFA1F4D-9D1C-4A10-A380-B189A257C9EE}"/>
+                <a16:creationId xmlns="" xmlns:a16="http://schemas.microsoft.com/office/drawing/2014/main" id="{5EFA1F4D-9D1C-4A10-A380-B189A257C9EE}"/>
               </a:ext>
             </a:extLst>
           </p:cNvPr>
@@ -253,7 +257,7 @@
           <a:p>
             <a:fld id="{D426F103-508E-467C-AF53-B35FDC2F36C0}" type="datetimeFigureOut">
               <a:rPr lang="en-US" smtClean="0"/>
-              <a:t>24-Oct-2019</a:t>
+              <a:t>10/30/19</a:t>
             </a:fld>
             <a:endParaRPr lang="en-US"/>
           </a:p>
@@ -264,7 +268,7 @@
           <p:cNvPr id="4" name="Footer Placeholder 3">
             <a:extLst>
               <a:ext uri="{FF2B5EF4-FFF2-40B4-BE49-F238E27FC236}">
-                <a16:creationId xmlns:a16="http://schemas.microsoft.com/office/drawing/2014/main" id="{159300ED-F01C-48C4-A4BA-0D5AA4DDDEBC}"/>
+                <a16:creationId xmlns="" xmlns:a16="http://schemas.microsoft.com/office/drawing/2014/main" id="{159300ED-F01C-48C4-A4BA-0D5AA4DDDEBC}"/>
               </a:ext>
             </a:extLst>
           </p:cNvPr>
@@ -301,7 +305,7 @@
           <p:cNvPr id="5" name="Slide Number Placeholder 4">
             <a:extLst>
               <a:ext uri="{FF2B5EF4-FFF2-40B4-BE49-F238E27FC236}">
-                <a16:creationId xmlns:a16="http://schemas.microsoft.com/office/drawing/2014/main" id="{3E4A373A-B4B2-4E7F-9FF0-5C9E079B3262}"/>
+                <a16:creationId xmlns="" xmlns:a16="http://schemas.microsoft.com/office/drawing/2014/main" id="{3E4A373A-B4B2-4E7F-9FF0-5C9E079B3262}"/>
               </a:ext>
             </a:extLst>
           </p:cNvPr>
@@ -430,7 +434,7 @@
           <a:p>
             <a:fld id="{A90D6CB4-478E-4505-A839-A5849C2F988C}" type="datetimeFigureOut">
               <a:rPr lang="en-US" smtClean="0"/>
-              <a:t>24-Oct-2019</a:t>
+              <a:t>10/30/19</a:t>
             </a:fld>
             <a:endParaRPr lang="en-US"/>
           </a:p>
@@ -762,7 +766,7 @@
           <a:p>
             <a:fld id="{FEC4ED2C-DC4C-4AFD-8B22-623D9727471E}" type="slidenum">
               <a:rPr lang="en-US" smtClean="0"/>
-              <a:t>5</a:t>
+              <a:t>1</a:t>
             </a:fld>
             <a:endParaRPr lang="en-US"/>
           </a:p>
@@ -771,7 +775,91 @@
     </p:spTree>
     <p:extLst>
       <p:ext uri="{BB962C8B-B14F-4D97-AF65-F5344CB8AC3E}">
-        <p14:creationId xmlns:p14="http://schemas.microsoft.com/office/powerpoint/2010/main" val="2640585122"/>
+        <p14:creationId xmlns:p14="http://schemas.microsoft.com/office/powerpoint/2010/main" val="819522045"/>
+      </p:ext>
+    </p:extLst>
+  </p:cSld>
+  <p:clrMapOvr>
+    <a:masterClrMapping/>
+  </p:clrMapOvr>
+</p:notes>
+</file>
+
+<file path=ppt/notesSlides/notesSlide10.xml><?xml version="1.0" encoding="utf-8"?>
+<p:notes xmlns:a="http://schemas.openxmlformats.org/drawingml/2006/main" xmlns:r="http://schemas.openxmlformats.org/officeDocument/2006/relationships" xmlns:p="http://schemas.openxmlformats.org/presentationml/2006/main">
+  <p:cSld>
+    <p:spTree>
+      <p:nvGrpSpPr>
+        <p:cNvPr id="1" name=""/>
+        <p:cNvGrpSpPr/>
+        <p:nvPr/>
+      </p:nvGrpSpPr>
+      <p:grpSpPr>
+        <a:xfrm>
+          <a:off x="0" y="0"/>
+          <a:ext cx="0" cy="0"/>
+          <a:chOff x="0" y="0"/>
+          <a:chExt cx="0" cy="0"/>
+        </a:xfrm>
+      </p:grpSpPr>
+      <p:sp>
+        <p:nvSpPr>
+          <p:cNvPr id="2" name="Slide Image Placeholder 1"/>
+          <p:cNvSpPr>
+            <a:spLocks noGrp="1" noRot="1" noChangeAspect="1"/>
+          </p:cNvSpPr>
+          <p:nvPr>
+            <p:ph type="sldImg"/>
+          </p:nvPr>
+        </p:nvSpPr>
+        <p:spPr/>
+      </p:sp>
+      <p:sp>
+        <p:nvSpPr>
+          <p:cNvPr id="3" name="Notes Placeholder 2"/>
+          <p:cNvSpPr>
+            <a:spLocks noGrp="1"/>
+          </p:cNvSpPr>
+          <p:nvPr>
+            <p:ph type="body" idx="1"/>
+          </p:nvPr>
+        </p:nvSpPr>
+        <p:spPr/>
+        <p:txBody>
+          <a:bodyPr/>
+          <a:lstStyle/>
+          <a:p>
+            <a:endParaRPr lang="en-US" dirty="0"/>
+          </a:p>
+        </p:txBody>
+      </p:sp>
+      <p:sp>
+        <p:nvSpPr>
+          <p:cNvPr id="4" name="Slide Number Placeholder 3"/>
+          <p:cNvSpPr>
+            <a:spLocks noGrp="1"/>
+          </p:cNvSpPr>
+          <p:nvPr>
+            <p:ph type="sldNum" sz="quarter" idx="10"/>
+          </p:nvPr>
+        </p:nvSpPr>
+        <p:spPr/>
+        <p:txBody>
+          <a:bodyPr/>
+          <a:lstStyle/>
+          <a:p>
+            <a:fld id="{FEC4ED2C-DC4C-4AFD-8B22-623D9727471E}" type="slidenum">
+              <a:rPr lang="en-US" smtClean="0"/>
+              <a:t>13</a:t>
+            </a:fld>
+            <a:endParaRPr lang="en-US"/>
+          </a:p>
+        </p:txBody>
+      </p:sp>
+    </p:spTree>
+    <p:extLst>
+      <p:ext uri="{BB962C8B-B14F-4D97-AF65-F5344CB8AC3E}">
+        <p14:creationId xmlns:p14="http://schemas.microsoft.com/office/powerpoint/2010/main" val="1126271439"/>
       </p:ext>
     </p:extLst>
   </p:cSld>
@@ -825,18 +913,6 @@
           <a:bodyPr/>
           <a:lstStyle/>
           <a:p>
-            <a:r>
-              <a:rPr lang="en-US" sz="1200" b="0" i="0" kern="1200" dirty="0" smtClean="0">
-                <a:solidFill>
-                  <a:schemeClr val="tx1"/>
-                </a:solidFill>
-                <a:effectLst/>
-                <a:latin typeface="+mn-lt"/>
-                <a:ea typeface="+mn-ea"/>
-                <a:cs typeface="+mn-cs"/>
-              </a:rPr>
-              <a:t>“The correct handling of API versioning has been one of the most difficult issues faced by developers of distributed systems. Various schemes have been proposed, ranging from the laissez faire approach taken by CORBA (Common Object Request Broker Architecture) to the stricter schemes used in DCOM (Distributed Component Object Model). With the advent of Web services, there are some new features that you can take advantage of that can help alleviate the problem, but the brutal fact of the matter is that versioning has not been built into the Web services architecture.”</a:t>
-            </a:r>
             <a:endParaRPr lang="en-US" dirty="0"/>
           </a:p>
         </p:txBody>
@@ -858,7 +934,7 @@
           <a:p>
             <a:fld id="{FEC4ED2C-DC4C-4AFD-8B22-623D9727471E}" type="slidenum">
               <a:rPr lang="en-US" smtClean="0"/>
-              <a:t>6</a:t>
+              <a:t>5</a:t>
             </a:fld>
             <a:endParaRPr lang="en-US"/>
           </a:p>
@@ -867,7 +943,7 @@
     </p:spTree>
     <p:extLst>
       <p:ext uri="{BB962C8B-B14F-4D97-AF65-F5344CB8AC3E}">
-        <p14:creationId xmlns:p14="http://schemas.microsoft.com/office/powerpoint/2010/main" val="650893799"/>
+        <p14:creationId xmlns:p14="http://schemas.microsoft.com/office/powerpoint/2010/main" val="2640585122"/>
       </p:ext>
     </p:extLst>
   </p:cSld>
@@ -922,54 +998,17 @@
           <a:lstStyle/>
           <a:p>
             <a:r>
-              <a:rPr lang="en-US" dirty="0" smtClean="0"/>
-              <a:t>Same approach:</a:t>
-            </a:r>
-            <a:r>
-              <a:rPr lang="en-US" baseline="0" dirty="0" smtClean="0"/>
-              <a:t> Twitter</a:t>
-            </a:r>
-          </a:p>
-          <a:p>
-            <a:endParaRPr lang="en-US" baseline="0" dirty="0" smtClean="0"/>
-          </a:p>
-          <a:p>
-            <a:r>
-              <a:rPr lang="en-US" baseline="0" dirty="0" smtClean="0"/>
-              <a:t>Trace off: </a:t>
-            </a:r>
-          </a:p>
-          <a:p>
-            <a:pPr marL="171450" indent="-171450">
-              <a:buFontTx/>
-              <a:buChar char="-"/>
-            </a:pPr>
-            <a:r>
-              <a:rPr lang="en-US" baseline="0" dirty="0" smtClean="0"/>
-              <a:t>need strong </a:t>
-            </a:r>
-            <a:r>
-              <a:rPr lang="en-US" baseline="0" dirty="0" err="1" smtClean="0"/>
-              <a:t>devops</a:t>
-            </a:r>
-            <a:endParaRPr lang="en-US" baseline="0" dirty="0" smtClean="0"/>
-          </a:p>
-          <a:p>
-            <a:pPr marL="171450" indent="-171450">
-              <a:buFontTx/>
-              <a:buChar char="-"/>
-            </a:pPr>
-            <a:r>
-              <a:rPr lang="en-US" baseline="0" dirty="0" smtClean="0"/>
-              <a:t>Leave big footprint</a:t>
-            </a:r>
-            <a:endParaRPr lang="en-US" baseline="0" dirty="0" smtClean="0"/>
-          </a:p>
-          <a:p>
-            <a:pPr marL="171450" indent="-171450">
-              <a:buFontTx/>
-              <a:buChar char="-"/>
-            </a:pPr>
+              <a:rPr lang="en-US" sz="1200" b="0" i="0" kern="1200" dirty="0" smtClean="0">
+                <a:solidFill>
+                  <a:schemeClr val="tx1"/>
+                </a:solidFill>
+                <a:effectLst/>
+                <a:latin typeface="+mn-lt"/>
+                <a:ea typeface="+mn-ea"/>
+                <a:cs typeface="+mn-cs"/>
+              </a:rPr>
+              <a:t>“The correct handling of API versioning has been one of the most difficult issues faced by developers of distributed systems. Various schemes have been proposed, ranging from the laissez faire approach taken by CORBA (Common Object Request Broker Architecture) to the stricter schemes used in DCOM (Distributed Component Object Model). With the advent of Web services, there are some new features that you can take advantage of that can help alleviate the problem, but the brutal fact of the matter is that versioning has not been built into the Web services architecture.”</a:t>
+            </a:r>
             <a:endParaRPr lang="en-US" dirty="0"/>
           </a:p>
         </p:txBody>
@@ -991,7 +1030,7 @@
           <a:p>
             <a:fld id="{FEC4ED2C-DC4C-4AFD-8B22-623D9727471E}" type="slidenum">
               <a:rPr lang="en-US" smtClean="0"/>
-              <a:t>7</a:t>
+              <a:t>6</a:t>
             </a:fld>
             <a:endParaRPr lang="en-US"/>
           </a:p>
@@ -1000,7 +1039,7 @@
     </p:spTree>
     <p:extLst>
       <p:ext uri="{BB962C8B-B14F-4D97-AF65-F5344CB8AC3E}">
-        <p14:creationId xmlns:p14="http://schemas.microsoft.com/office/powerpoint/2010/main" val="1705485101"/>
+        <p14:creationId xmlns:p14="http://schemas.microsoft.com/office/powerpoint/2010/main" val="650893799"/>
       </p:ext>
     </p:extLst>
   </p:cSld>
@@ -1054,14 +1093,38 @@
           <a:bodyPr/>
           <a:lstStyle/>
           <a:p>
+            <a:r>
+              <a:rPr lang="en-US" dirty="0" smtClean="0"/>
+              <a:t>Same approach:</a:t>
+            </a:r>
+            <a:r>
+              <a:rPr lang="en-US" baseline="0" dirty="0" smtClean="0"/>
+              <a:t> Twitter</a:t>
+            </a:r>
+          </a:p>
+          <a:p>
+            <a:endParaRPr lang="en-US" baseline="0" dirty="0" smtClean="0"/>
+          </a:p>
+          <a:p>
+            <a:r>
+              <a:rPr lang="en-US" baseline="0" dirty="0" smtClean="0"/>
+              <a:t>Trace off: </a:t>
+            </a:r>
+          </a:p>
+          <a:p>
             <a:pPr marL="171450" indent="-171450">
               <a:buFontTx/>
               <a:buChar char="-"/>
             </a:pPr>
             <a:r>
               <a:rPr lang="en-US" baseline="0" dirty="0" smtClean="0"/>
-              <a:t>Control more</a:t>
-            </a:r>
+              <a:t>need strong </a:t>
+            </a:r>
+            <a:r>
+              <a:rPr lang="en-US" baseline="0" dirty="0" err="1" smtClean="0"/>
+              <a:t>devops</a:t>
+            </a:r>
+            <a:endParaRPr lang="en-US" baseline="0" dirty="0" smtClean="0"/>
           </a:p>
           <a:p>
             <a:pPr marL="171450" indent="-171450">
@@ -1070,26 +1133,7 @@
             </a:pPr>
             <a:r>
               <a:rPr lang="en-US" baseline="0" dirty="0" smtClean="0"/>
-              <a:t>Not Expose version on </a:t>
-            </a:r>
-            <a:r>
-              <a:rPr lang="en-US" baseline="0" dirty="0" err="1" smtClean="0"/>
-              <a:t>url</a:t>
-            </a:r>
-            <a:endParaRPr lang="en-US" dirty="0" smtClean="0"/>
-          </a:p>
-          <a:p>
-            <a:r>
-              <a:rPr lang="en-US" dirty="0" smtClean="0"/>
-              <a:t>Trace</a:t>
-            </a:r>
-            <a:r>
-              <a:rPr lang="en-US" baseline="0" dirty="0" smtClean="0"/>
-              <a:t> </a:t>
-            </a:r>
-            <a:r>
-              <a:rPr lang="en-US" baseline="0" dirty="0" smtClean="0"/>
-              <a:t>off: </a:t>
+              <a:t>Leave big footprint</a:t>
             </a:r>
           </a:p>
           <a:p>
@@ -1097,62 +1141,6 @@
               <a:buFontTx/>
               <a:buChar char="-"/>
             </a:pPr>
-            <a:r>
-              <a:rPr lang="en-US" baseline="0" dirty="0" smtClean="0"/>
-              <a:t>Be ware off firewall</a:t>
-            </a:r>
-          </a:p>
-          <a:p>
-            <a:pPr marL="171450" indent="-171450">
-              <a:buFontTx/>
-              <a:buChar char="-"/>
-            </a:pPr>
-            <a:r>
-              <a:rPr lang="en-US" baseline="0" dirty="0" smtClean="0"/>
-              <a:t>Convention/</a:t>
-            </a:r>
-            <a:r>
-              <a:rPr lang="en-US" baseline="0" dirty="0" err="1" smtClean="0"/>
-              <a:t>Standardise</a:t>
-            </a:r>
-            <a:r>
-              <a:rPr lang="en-US" baseline="0" dirty="0" smtClean="0"/>
-              <a:t>?</a:t>
-            </a:r>
-          </a:p>
-          <a:p>
-            <a:pPr marL="171450" indent="-171450">
-              <a:buFontTx/>
-              <a:buChar char="-"/>
-            </a:pPr>
-            <a:r>
-              <a:rPr lang="en-US" baseline="0" dirty="0" smtClean="0"/>
-              <a:t>HTML </a:t>
-            </a:r>
-            <a:r>
-              <a:rPr lang="en-US" baseline="0" dirty="0" smtClean="0"/>
-              <a:t>form</a:t>
-            </a:r>
-          </a:p>
-          <a:p>
-            <a:pPr marL="171450" indent="-171450">
-              <a:buFontTx/>
-              <a:buChar char="-"/>
-            </a:pPr>
-            <a:r>
-              <a:rPr lang="en-US" baseline="0" dirty="0" smtClean="0"/>
-              <a:t>Difficult to test</a:t>
-            </a:r>
-          </a:p>
-          <a:p>
-            <a:pPr marL="171450" indent="-171450">
-              <a:buFontTx/>
-              <a:buChar char="-"/>
-            </a:pPr>
-            <a:r>
-              <a:rPr lang="en-US" baseline="0" dirty="0" smtClean="0"/>
-              <a:t>Cannot call directly from browser</a:t>
-            </a:r>
             <a:endParaRPr lang="en-US" dirty="0"/>
           </a:p>
         </p:txBody>
@@ -1174,7 +1162,7 @@
           <a:p>
             <a:fld id="{FEC4ED2C-DC4C-4AFD-8B22-623D9727471E}" type="slidenum">
               <a:rPr lang="en-US" smtClean="0"/>
-              <a:t>8</a:t>
+              <a:t>7</a:t>
             </a:fld>
             <a:endParaRPr lang="en-US"/>
           </a:p>
@@ -1183,7 +1171,7 @@
     </p:spTree>
     <p:extLst>
       <p:ext uri="{BB962C8B-B14F-4D97-AF65-F5344CB8AC3E}">
-        <p14:creationId xmlns:p14="http://schemas.microsoft.com/office/powerpoint/2010/main" val="2973050099"/>
+        <p14:creationId xmlns:p14="http://schemas.microsoft.com/office/powerpoint/2010/main" val="1705485101"/>
       </p:ext>
     </p:extLst>
   </p:cSld>
@@ -1237,9 +1225,96 @@
           <a:bodyPr/>
           <a:lstStyle/>
           <a:p>
+            <a:pPr marL="171450" indent="-171450">
+              <a:buFontTx/>
+              <a:buChar char="-"/>
+            </a:pPr>
+            <a:r>
+              <a:rPr lang="en-US" baseline="0" dirty="0" smtClean="0"/>
+              <a:t>Control more</a:t>
+            </a:r>
+          </a:p>
+          <a:p>
+            <a:pPr marL="171450" indent="-171450">
+              <a:buFontTx/>
+              <a:buChar char="-"/>
+            </a:pPr>
+            <a:r>
+              <a:rPr lang="en-US" baseline="0" dirty="0" smtClean="0"/>
+              <a:t>Not Expose version on </a:t>
+            </a:r>
+            <a:r>
+              <a:rPr lang="en-US" baseline="0" dirty="0" err="1" smtClean="0"/>
+              <a:t>url</a:t>
+            </a:r>
+            <a:endParaRPr lang="en-US" dirty="0" smtClean="0"/>
+          </a:p>
+          <a:p>
             <a:r>
               <a:rPr lang="en-US" dirty="0" smtClean="0"/>
-              <a:t>Trace off:</a:t>
+              <a:t>Trace</a:t>
+            </a:r>
+            <a:r>
+              <a:rPr lang="en-US" baseline="0" dirty="0" smtClean="0"/>
+              <a:t> off: </a:t>
+            </a:r>
+          </a:p>
+          <a:p>
+            <a:pPr marL="171450" indent="-171450">
+              <a:buFontTx/>
+              <a:buChar char="-"/>
+            </a:pPr>
+            <a:r>
+              <a:rPr lang="en-US" baseline="0" dirty="0" smtClean="0"/>
+              <a:t>Be ware off firewall</a:t>
+            </a:r>
+          </a:p>
+          <a:p>
+            <a:pPr marL="171450" indent="-171450">
+              <a:buFontTx/>
+              <a:buChar char="-"/>
+            </a:pPr>
+            <a:r>
+              <a:rPr lang="en-US" baseline="0" dirty="0" smtClean="0"/>
+              <a:t>Convention/</a:t>
+            </a:r>
+            <a:r>
+              <a:rPr lang="en-US" baseline="0" dirty="0" err="1" smtClean="0"/>
+              <a:t>Standardise</a:t>
+            </a:r>
+            <a:r>
+              <a:rPr lang="en-US" baseline="0" dirty="0" smtClean="0"/>
+              <a:t>?</a:t>
+            </a:r>
+          </a:p>
+          <a:p>
+            <a:pPr marL="171450" indent="-171450">
+              <a:buFontTx/>
+              <a:buChar char="-"/>
+            </a:pPr>
+            <a:r>
+              <a:rPr lang="en-US" baseline="0" dirty="0" smtClean="0"/>
+              <a:t>HTML form</a:t>
+            </a:r>
+          </a:p>
+          <a:p>
+            <a:pPr marL="171450" indent="-171450">
+              <a:buFontTx/>
+              <a:buChar char="-"/>
+            </a:pPr>
+            <a:r>
+              <a:rPr lang="en-US" baseline="0" dirty="0" smtClean="0"/>
+              <a:t>Difficult to test</a:t>
+            </a:r>
+          </a:p>
+          <a:p>
+            <a:pPr marL="171450" indent="-171450">
+              <a:buFontTx/>
+              <a:buChar char="-"/>
+            </a:pPr>
+            <a:r>
+              <a:rPr lang="en-US" baseline="0" dirty="0" smtClean="0"/>
+              <a:t>Cannot call directly from browser</a:t>
             </a:r>
             <a:endParaRPr lang="en-US" dirty="0"/>
           </a:p>
@@ -1262,7 +1337,7 @@
           <a:p>
             <a:fld id="{FEC4ED2C-DC4C-4AFD-8B22-623D9727471E}" type="slidenum">
               <a:rPr lang="en-US" smtClean="0"/>
-              <a:t>9</a:t>
+              <a:t>8</a:t>
             </a:fld>
             <a:endParaRPr lang="en-US"/>
           </a:p>
@@ -1271,7 +1346,7 @@
     </p:spTree>
     <p:extLst>
       <p:ext uri="{BB962C8B-B14F-4D97-AF65-F5344CB8AC3E}">
-        <p14:creationId xmlns:p14="http://schemas.microsoft.com/office/powerpoint/2010/main" val="4029540418"/>
+        <p14:creationId xmlns:p14="http://schemas.microsoft.com/office/powerpoint/2010/main" val="2973050099"/>
       </p:ext>
     </p:extLst>
   </p:cSld>
@@ -1325,6 +1400,10 @@
           <a:bodyPr/>
           <a:lstStyle/>
           <a:p>
+            <a:r>
+              <a:rPr lang="en-US" dirty="0" smtClean="0"/>
+              <a:t>Trace off:</a:t>
+            </a:r>
             <a:endParaRPr lang="en-US" dirty="0"/>
           </a:p>
         </p:txBody>
@@ -1346,6 +1425,90 @@
           <a:p>
             <a:fld id="{FEC4ED2C-DC4C-4AFD-8B22-623D9727471E}" type="slidenum">
               <a:rPr lang="en-US" smtClean="0"/>
+              <a:t>9</a:t>
+            </a:fld>
+            <a:endParaRPr lang="en-US"/>
+          </a:p>
+        </p:txBody>
+      </p:sp>
+    </p:spTree>
+    <p:extLst>
+      <p:ext uri="{BB962C8B-B14F-4D97-AF65-F5344CB8AC3E}">
+        <p14:creationId xmlns:p14="http://schemas.microsoft.com/office/powerpoint/2010/main" val="4029540418"/>
+      </p:ext>
+    </p:extLst>
+  </p:cSld>
+  <p:clrMapOvr>
+    <a:masterClrMapping/>
+  </p:clrMapOvr>
+</p:notes>
+</file>
+
+<file path=ppt/notesSlides/notesSlide7.xml><?xml version="1.0" encoding="utf-8"?>
+<p:notes xmlns:a="http://schemas.openxmlformats.org/drawingml/2006/main" xmlns:r="http://schemas.openxmlformats.org/officeDocument/2006/relationships" xmlns:p="http://schemas.openxmlformats.org/presentationml/2006/main">
+  <p:cSld>
+    <p:spTree>
+      <p:nvGrpSpPr>
+        <p:cNvPr id="1" name=""/>
+        <p:cNvGrpSpPr/>
+        <p:nvPr/>
+      </p:nvGrpSpPr>
+      <p:grpSpPr>
+        <a:xfrm>
+          <a:off x="0" y="0"/>
+          <a:ext cx="0" cy="0"/>
+          <a:chOff x="0" y="0"/>
+          <a:chExt cx="0" cy="0"/>
+        </a:xfrm>
+      </p:grpSpPr>
+      <p:sp>
+        <p:nvSpPr>
+          <p:cNvPr id="2" name="Slide Image Placeholder 1"/>
+          <p:cNvSpPr>
+            <a:spLocks noGrp="1" noRot="1" noChangeAspect="1"/>
+          </p:cNvSpPr>
+          <p:nvPr>
+            <p:ph type="sldImg"/>
+          </p:nvPr>
+        </p:nvSpPr>
+        <p:spPr/>
+      </p:sp>
+      <p:sp>
+        <p:nvSpPr>
+          <p:cNvPr id="3" name="Notes Placeholder 2"/>
+          <p:cNvSpPr>
+            <a:spLocks noGrp="1"/>
+          </p:cNvSpPr>
+          <p:nvPr>
+            <p:ph type="body" idx="1"/>
+          </p:nvPr>
+        </p:nvSpPr>
+        <p:spPr/>
+        <p:txBody>
+          <a:bodyPr/>
+          <a:lstStyle/>
+          <a:p>
+            <a:endParaRPr lang="en-US" dirty="0"/>
+          </a:p>
+        </p:txBody>
+      </p:sp>
+      <p:sp>
+        <p:nvSpPr>
+          <p:cNvPr id="4" name="Slide Number Placeholder 3"/>
+          <p:cNvSpPr>
+            <a:spLocks noGrp="1"/>
+          </p:cNvSpPr>
+          <p:nvPr>
+            <p:ph type="sldNum" sz="quarter" idx="10"/>
+          </p:nvPr>
+        </p:nvSpPr>
+        <p:spPr/>
+        <p:txBody>
+          <a:bodyPr/>
+          <a:lstStyle/>
+          <a:p>
+            <a:fld id="{FEC4ED2C-DC4C-4AFD-8B22-623D9727471E}" type="slidenum">
+              <a:rPr lang="en-US" smtClean="0"/>
               <a:t>10</a:t>
             </a:fld>
             <a:endParaRPr lang="en-US"/>
@@ -1356,6 +1519,174 @@
     <p:extLst>
       <p:ext uri="{BB962C8B-B14F-4D97-AF65-F5344CB8AC3E}">
         <p14:creationId xmlns:p14="http://schemas.microsoft.com/office/powerpoint/2010/main" val="690593739"/>
+      </p:ext>
+    </p:extLst>
+  </p:cSld>
+  <p:clrMapOvr>
+    <a:masterClrMapping/>
+  </p:clrMapOvr>
+</p:notes>
+</file>
+
+<file path=ppt/notesSlides/notesSlide8.xml><?xml version="1.0" encoding="utf-8"?>
+<p:notes xmlns:a="http://schemas.openxmlformats.org/drawingml/2006/main" xmlns:r="http://schemas.openxmlformats.org/officeDocument/2006/relationships" xmlns:p="http://schemas.openxmlformats.org/presentationml/2006/main">
+  <p:cSld>
+    <p:spTree>
+      <p:nvGrpSpPr>
+        <p:cNvPr id="1" name=""/>
+        <p:cNvGrpSpPr/>
+        <p:nvPr/>
+      </p:nvGrpSpPr>
+      <p:grpSpPr>
+        <a:xfrm>
+          <a:off x="0" y="0"/>
+          <a:ext cx="0" cy="0"/>
+          <a:chOff x="0" y="0"/>
+          <a:chExt cx="0" cy="0"/>
+        </a:xfrm>
+      </p:grpSpPr>
+      <p:sp>
+        <p:nvSpPr>
+          <p:cNvPr id="2" name="Slide Image Placeholder 1"/>
+          <p:cNvSpPr>
+            <a:spLocks noGrp="1" noRot="1" noChangeAspect="1"/>
+          </p:cNvSpPr>
+          <p:nvPr>
+            <p:ph type="sldImg"/>
+          </p:nvPr>
+        </p:nvSpPr>
+        <p:spPr/>
+      </p:sp>
+      <p:sp>
+        <p:nvSpPr>
+          <p:cNvPr id="3" name="Notes Placeholder 2"/>
+          <p:cNvSpPr>
+            <a:spLocks noGrp="1"/>
+          </p:cNvSpPr>
+          <p:nvPr>
+            <p:ph type="body" idx="1"/>
+          </p:nvPr>
+        </p:nvSpPr>
+        <p:spPr/>
+        <p:txBody>
+          <a:bodyPr/>
+          <a:lstStyle/>
+          <a:p>
+            <a:endParaRPr lang="en-US" dirty="0"/>
+          </a:p>
+        </p:txBody>
+      </p:sp>
+      <p:sp>
+        <p:nvSpPr>
+          <p:cNvPr id="4" name="Slide Number Placeholder 3"/>
+          <p:cNvSpPr>
+            <a:spLocks noGrp="1"/>
+          </p:cNvSpPr>
+          <p:nvPr>
+            <p:ph type="sldNum" sz="quarter" idx="10"/>
+          </p:nvPr>
+        </p:nvSpPr>
+        <p:spPr/>
+        <p:txBody>
+          <a:bodyPr/>
+          <a:lstStyle/>
+          <a:p>
+            <a:fld id="{FEC4ED2C-DC4C-4AFD-8B22-623D9727471E}" type="slidenum">
+              <a:rPr lang="en-US" smtClean="0"/>
+              <a:t>11</a:t>
+            </a:fld>
+            <a:endParaRPr lang="en-US"/>
+          </a:p>
+        </p:txBody>
+      </p:sp>
+    </p:spTree>
+    <p:extLst>
+      <p:ext uri="{BB962C8B-B14F-4D97-AF65-F5344CB8AC3E}">
+        <p14:creationId xmlns:p14="http://schemas.microsoft.com/office/powerpoint/2010/main" val="954604113"/>
+      </p:ext>
+    </p:extLst>
+  </p:cSld>
+  <p:clrMapOvr>
+    <a:masterClrMapping/>
+  </p:clrMapOvr>
+</p:notes>
+</file>
+
+<file path=ppt/notesSlides/notesSlide9.xml><?xml version="1.0" encoding="utf-8"?>
+<p:notes xmlns:a="http://schemas.openxmlformats.org/drawingml/2006/main" xmlns:r="http://schemas.openxmlformats.org/officeDocument/2006/relationships" xmlns:p="http://schemas.openxmlformats.org/presentationml/2006/main">
+  <p:cSld>
+    <p:spTree>
+      <p:nvGrpSpPr>
+        <p:cNvPr id="1" name=""/>
+        <p:cNvGrpSpPr/>
+        <p:nvPr/>
+      </p:nvGrpSpPr>
+      <p:grpSpPr>
+        <a:xfrm>
+          <a:off x="0" y="0"/>
+          <a:ext cx="0" cy="0"/>
+          <a:chOff x="0" y="0"/>
+          <a:chExt cx="0" cy="0"/>
+        </a:xfrm>
+      </p:grpSpPr>
+      <p:sp>
+        <p:nvSpPr>
+          <p:cNvPr id="2" name="Slide Image Placeholder 1"/>
+          <p:cNvSpPr>
+            <a:spLocks noGrp="1" noRot="1" noChangeAspect="1"/>
+          </p:cNvSpPr>
+          <p:nvPr>
+            <p:ph type="sldImg"/>
+          </p:nvPr>
+        </p:nvSpPr>
+        <p:spPr/>
+      </p:sp>
+      <p:sp>
+        <p:nvSpPr>
+          <p:cNvPr id="3" name="Notes Placeholder 2"/>
+          <p:cNvSpPr>
+            <a:spLocks noGrp="1"/>
+          </p:cNvSpPr>
+          <p:nvPr>
+            <p:ph type="body" idx="1"/>
+          </p:nvPr>
+        </p:nvSpPr>
+        <p:spPr/>
+        <p:txBody>
+          <a:bodyPr/>
+          <a:lstStyle/>
+          <a:p>
+            <a:endParaRPr lang="en-US" dirty="0"/>
+          </a:p>
+        </p:txBody>
+      </p:sp>
+      <p:sp>
+        <p:nvSpPr>
+          <p:cNvPr id="4" name="Slide Number Placeholder 3"/>
+          <p:cNvSpPr>
+            <a:spLocks noGrp="1"/>
+          </p:cNvSpPr>
+          <p:nvPr>
+            <p:ph type="sldNum" sz="quarter" idx="10"/>
+          </p:nvPr>
+        </p:nvSpPr>
+        <p:spPr/>
+        <p:txBody>
+          <a:bodyPr/>
+          <a:lstStyle/>
+          <a:p>
+            <a:fld id="{FEC4ED2C-DC4C-4AFD-8B22-623D9727471E}" type="slidenum">
+              <a:rPr lang="en-US" smtClean="0"/>
+              <a:t>12</a:t>
+            </a:fld>
+            <a:endParaRPr lang="en-US"/>
+          </a:p>
+        </p:txBody>
+      </p:sp>
+    </p:spTree>
+    <p:extLst>
+      <p:ext uri="{BB962C8B-B14F-4D97-AF65-F5344CB8AC3E}">
+        <p14:creationId xmlns:p14="http://schemas.microsoft.com/office/powerpoint/2010/main" val="185404780"/>
       </p:ext>
     </p:extLst>
   </p:cSld>
@@ -1401,7 +1732,7 @@
           <p:cNvPr id="5" name="Text Placeholder 4">
             <a:extLst>
               <a:ext uri="{FF2B5EF4-FFF2-40B4-BE49-F238E27FC236}">
-                <a16:creationId xmlns:a16="http://schemas.microsoft.com/office/drawing/2014/main" id="{BCFB55D0-ABFE-497D-9DC9-FC6560D4EC7C}"/>
+                <a16:creationId xmlns="" xmlns:a16="http://schemas.microsoft.com/office/drawing/2014/main" id="{BCFB55D0-ABFE-497D-9DC9-FC6560D4EC7C}"/>
               </a:ext>
             </a:extLst>
           </p:cNvPr>
@@ -1443,7 +1774,7 @@
           <p:cNvPr id="3" name="Text Placeholder 2">
             <a:extLst>
               <a:ext uri="{FF2B5EF4-FFF2-40B4-BE49-F238E27FC236}">
-                <a16:creationId xmlns:a16="http://schemas.microsoft.com/office/drawing/2014/main" id="{0016BE0E-2EA8-42B6-96D6-9BD0D3B5D591}"/>
+                <a16:creationId xmlns="" xmlns:a16="http://schemas.microsoft.com/office/drawing/2014/main" id="{0016BE0E-2EA8-42B6-96D6-9BD0D3B5D591}"/>
               </a:ext>
             </a:extLst>
           </p:cNvPr>
@@ -1489,7 +1820,7 @@
           <p:cNvPr id="4" name="Picture Placeholder 1">
             <a:extLst>
               <a:ext uri="{FF2B5EF4-FFF2-40B4-BE49-F238E27FC236}">
-                <a16:creationId xmlns:a16="http://schemas.microsoft.com/office/drawing/2014/main" id="{3C2217C6-1078-4A1E-BDB7-5880DF4B3326}"/>
+                <a16:creationId xmlns="" xmlns:a16="http://schemas.microsoft.com/office/drawing/2014/main" id="{3C2217C6-1078-4A1E-BDB7-5880DF4B3326}"/>
               </a:ext>
             </a:extLst>
           </p:cNvPr>
@@ -1515,7 +1846,7 @@
           <p:cNvPr id="8" name="Straight Connector 7">
             <a:extLst>
               <a:ext uri="{FF2B5EF4-FFF2-40B4-BE49-F238E27FC236}">
-                <a16:creationId xmlns:a16="http://schemas.microsoft.com/office/drawing/2014/main" id="{086C82DE-CE36-4680-AB73-302BEB82C9A9}"/>
+                <a16:creationId xmlns="" xmlns:a16="http://schemas.microsoft.com/office/drawing/2014/main" id="{086C82DE-CE36-4680-AB73-302BEB82C9A9}"/>
               </a:ext>
             </a:extLst>
           </p:cNvPr>
@@ -1556,7 +1887,7 @@
           <p:cNvPr id="9" name="Picture 2">
             <a:extLst>
               <a:ext uri="{FF2B5EF4-FFF2-40B4-BE49-F238E27FC236}">
-                <a16:creationId xmlns:a16="http://schemas.microsoft.com/office/drawing/2014/main" id="{3C70061B-E50B-4A2F-B51B-DB540F275EB2}"/>
+                <a16:creationId xmlns="" xmlns:a16="http://schemas.microsoft.com/office/drawing/2014/main" id="{3C70061B-E50B-4A2F-B51B-DB540F275EB2}"/>
               </a:ext>
             </a:extLst>
           </p:cNvPr>
@@ -1672,7 +2003,7 @@
           <p:cNvPr id="5" name="Content Placeholder 4">
             <a:extLst>
               <a:ext uri="{FF2B5EF4-FFF2-40B4-BE49-F238E27FC236}">
-                <a16:creationId xmlns:a16="http://schemas.microsoft.com/office/drawing/2014/main" id="{CB69A7D1-BDE9-4D41-875F-FE54392B57BD}"/>
+                <a16:creationId xmlns="" xmlns:a16="http://schemas.microsoft.com/office/drawing/2014/main" id="{CB69A7D1-BDE9-4D41-875F-FE54392B57BD}"/>
               </a:ext>
             </a:extLst>
           </p:cNvPr>
@@ -1718,7 +2049,7 @@
           <p:cNvPr id="7" name="Text Placeholder 6">
             <a:extLst>
               <a:ext uri="{FF2B5EF4-FFF2-40B4-BE49-F238E27FC236}">
-                <a16:creationId xmlns:a16="http://schemas.microsoft.com/office/drawing/2014/main" id="{6D768668-4B34-4B39-8938-3596E00266AE}"/>
+                <a16:creationId xmlns="" xmlns:a16="http://schemas.microsoft.com/office/drawing/2014/main" id="{6D768668-4B34-4B39-8938-3596E00266AE}"/>
               </a:ext>
             </a:extLst>
           </p:cNvPr>
@@ -1902,7 +2233,7 @@
           <p:cNvPr id="10" name="Text Placeholder 9">
             <a:extLst>
               <a:ext uri="{FF2B5EF4-FFF2-40B4-BE49-F238E27FC236}">
-                <a16:creationId xmlns:a16="http://schemas.microsoft.com/office/drawing/2014/main" id="{A33FCE1F-E612-4B3B-AE8D-05EBC233AC02}"/>
+                <a16:creationId xmlns="" xmlns:a16="http://schemas.microsoft.com/office/drawing/2014/main" id="{A33FCE1F-E612-4B3B-AE8D-05EBC233AC02}"/>
               </a:ext>
             </a:extLst>
           </p:cNvPr>
@@ -1947,7 +2278,7 @@
           <p:cNvPr id="5" name="Content Placeholder 2">
             <a:extLst>
               <a:ext uri="{FF2B5EF4-FFF2-40B4-BE49-F238E27FC236}">
-                <a16:creationId xmlns:a16="http://schemas.microsoft.com/office/drawing/2014/main" id="{B17B5848-2E3E-4DEA-8C5C-045487A85BBD}"/>
+                <a16:creationId xmlns="" xmlns:a16="http://schemas.microsoft.com/office/drawing/2014/main" id="{B17B5848-2E3E-4DEA-8C5C-045487A85BBD}"/>
               </a:ext>
             </a:extLst>
           </p:cNvPr>
@@ -2069,7 +2400,7 @@
           <p:cNvPr id="4" name="Rectangle 3">
             <a:extLst>
               <a:ext uri="{FF2B5EF4-FFF2-40B4-BE49-F238E27FC236}">
-                <a16:creationId xmlns:a16="http://schemas.microsoft.com/office/drawing/2014/main" id="{2E6A684A-B3E7-410E-95FF-EEF980A37401}"/>
+                <a16:creationId xmlns="" xmlns:a16="http://schemas.microsoft.com/office/drawing/2014/main" id="{2E6A684A-B3E7-410E-95FF-EEF980A37401}"/>
               </a:ext>
             </a:extLst>
           </p:cNvPr>
@@ -2128,7 +2459,7 @@
           <p:cNvPr id="6" name="Title 1">
             <a:extLst>
               <a:ext uri="{FF2B5EF4-FFF2-40B4-BE49-F238E27FC236}">
-                <a16:creationId xmlns:a16="http://schemas.microsoft.com/office/drawing/2014/main" id="{B4DE97B5-8478-4E66-9976-775194ADBB8F}"/>
+                <a16:creationId xmlns="" xmlns:a16="http://schemas.microsoft.com/office/drawing/2014/main" id="{B4DE97B5-8478-4E66-9976-775194ADBB8F}"/>
               </a:ext>
             </a:extLst>
           </p:cNvPr>
@@ -2168,7 +2499,7 @@
           <p:cNvPr id="8" name="Content Placeholder 14">
             <a:extLst>
               <a:ext uri="{FF2B5EF4-FFF2-40B4-BE49-F238E27FC236}">
-                <a16:creationId xmlns:a16="http://schemas.microsoft.com/office/drawing/2014/main" id="{DD1F93C3-4864-401C-951F-755BEF125B34}"/>
+                <a16:creationId xmlns="" xmlns:a16="http://schemas.microsoft.com/office/drawing/2014/main" id="{DD1F93C3-4864-401C-951F-755BEF125B34}"/>
               </a:ext>
             </a:extLst>
           </p:cNvPr>
@@ -2219,7 +2550,7 @@
           <p:cNvPr id="9" name="Picture Placeholder 11">
             <a:extLst>
               <a:ext uri="{FF2B5EF4-FFF2-40B4-BE49-F238E27FC236}">
-                <a16:creationId xmlns:a16="http://schemas.microsoft.com/office/drawing/2014/main" id="{988EE34E-7ED5-44B3-84B2-9FF73FDA94F7}"/>
+                <a16:creationId xmlns="" xmlns:a16="http://schemas.microsoft.com/office/drawing/2014/main" id="{988EE34E-7ED5-44B3-84B2-9FF73FDA94F7}"/>
               </a:ext>
             </a:extLst>
           </p:cNvPr>
@@ -2320,7 +2651,7 @@
           <p:cNvPr id="16" name="Picture 15">
             <a:extLst>
               <a:ext uri="{FF2B5EF4-FFF2-40B4-BE49-F238E27FC236}">
-                <a16:creationId xmlns:a16="http://schemas.microsoft.com/office/drawing/2014/main" id="{BD571E0C-2E67-43C2-9918-1226BF86C486}"/>
+                <a16:creationId xmlns="" xmlns:a16="http://schemas.microsoft.com/office/drawing/2014/main" id="{BD571E0C-2E67-43C2-9918-1226BF86C486}"/>
               </a:ext>
             </a:extLst>
           </p:cNvPr>
@@ -2696,7 +3027,7 @@
           <p:cNvPr id="2" name="Text Placeholder 1">
             <a:extLst>
               <a:ext uri="{FF2B5EF4-FFF2-40B4-BE49-F238E27FC236}">
-                <a16:creationId xmlns:a16="http://schemas.microsoft.com/office/drawing/2014/main" id="{E06440B9-86AC-44DA-977E-1E2D5A19ADBE}"/>
+                <a16:creationId xmlns="" xmlns:a16="http://schemas.microsoft.com/office/drawing/2014/main" id="{E06440B9-86AC-44DA-977E-1E2D5A19ADBE}"/>
               </a:ext>
             </a:extLst>
           </p:cNvPr>
@@ -2721,7 +3052,7 @@
           <p:cNvPr id="3" name="Text Placeholder 2">
             <a:extLst>
               <a:ext uri="{FF2B5EF4-FFF2-40B4-BE49-F238E27FC236}">
-                <a16:creationId xmlns:a16="http://schemas.microsoft.com/office/drawing/2014/main" id="{0BA97F9D-C268-4CE9-A509-52E09240D4BA}"/>
+                <a16:creationId xmlns="" xmlns:a16="http://schemas.microsoft.com/office/drawing/2014/main" id="{0BA97F9D-C268-4CE9-A509-52E09240D4BA}"/>
               </a:ext>
             </a:extLst>
           </p:cNvPr>
@@ -2746,7 +3077,7 @@
           <p:cNvPr id="4" name="Picture Placeholder 3">
             <a:extLst>
               <a:ext uri="{FF2B5EF4-FFF2-40B4-BE49-F238E27FC236}">
-                <a16:creationId xmlns:a16="http://schemas.microsoft.com/office/drawing/2014/main" id="{218B74B3-21D4-487F-8951-52A9E6336D34}"/>
+                <a16:creationId xmlns="" xmlns:a16="http://schemas.microsoft.com/office/drawing/2014/main" id="{218B74B3-21D4-487F-8951-52A9E6336D34}"/>
               </a:ext>
             </a:extLst>
           </p:cNvPr>
@@ -2898,6 +3229,964 @@
 </p:sld>
 </file>
 
+<file path=ppt/slides/slide11.xml><?xml version="1.0" encoding="utf-8"?>
+<p:sld xmlns:a="http://schemas.openxmlformats.org/drawingml/2006/main" xmlns:r="http://schemas.openxmlformats.org/officeDocument/2006/relationships" xmlns:p="http://schemas.openxmlformats.org/presentationml/2006/main">
+  <p:cSld>
+    <p:spTree>
+      <p:nvGrpSpPr>
+        <p:cNvPr id="1" name=""/>
+        <p:cNvGrpSpPr/>
+        <p:nvPr/>
+      </p:nvGrpSpPr>
+      <p:grpSpPr>
+        <a:xfrm>
+          <a:off x="0" y="0"/>
+          <a:ext cx="0" cy="0"/>
+          <a:chOff x="0" y="0"/>
+          <a:chExt cx="0" cy="0"/>
+        </a:xfrm>
+      </p:grpSpPr>
+      <p:sp>
+        <p:nvSpPr>
+          <p:cNvPr id="2" name="Content Placeholder 1"/>
+          <p:cNvSpPr>
+            <a:spLocks noGrp="1"/>
+          </p:cNvSpPr>
+          <p:nvPr>
+            <p:ph sz="quarter" idx="10"/>
+          </p:nvPr>
+        </p:nvSpPr>
+        <p:spPr>
+          <a:xfrm>
+            <a:off x="838200" y="685801"/>
+            <a:ext cx="10515600" cy="609599"/>
+          </a:xfrm>
+        </p:spPr>
+        <p:txBody>
+          <a:bodyPr/>
+          <a:lstStyle/>
+          <a:p>
+            <a:r>
+              <a:rPr lang="en-US" dirty="0" smtClean="0"/>
+              <a:t>WHAT IS JAVA EXECUTOR?</a:t>
+            </a:r>
+            <a:endParaRPr lang="en-US" dirty="0"/>
+          </a:p>
+        </p:txBody>
+      </p:sp>
+      <p:sp>
+        <p:nvSpPr>
+          <p:cNvPr id="9" name="TextBox 8"/>
+          <p:cNvSpPr txBox="1"/>
+          <p:nvPr/>
+        </p:nvSpPr>
+        <p:spPr>
+          <a:xfrm>
+            <a:off x="0" y="0"/>
+            <a:ext cx="3886200" cy="461665"/>
+          </a:xfrm>
+          <a:prstGeom prst="rect">
+            <a:avLst/>
+          </a:prstGeom>
+          <a:noFill/>
+        </p:spPr>
+        <p:txBody>
+          <a:bodyPr wrap="square" rtlCol="0">
+            <a:spAutoFit/>
+          </a:bodyPr>
+          <a:lstStyle/>
+          <a:p>
+            <a:r>
+              <a:rPr lang="en-US" sz="2400" i="1" dirty="0" smtClean="0">
+                <a:solidFill>
+                  <a:srgbClr val="02A9F7"/>
+                </a:solidFill>
+              </a:rPr>
+              <a:t>JAVA FUTURE</a:t>
+            </a:r>
+            <a:endParaRPr lang="en-US" sz="2400" i="1" dirty="0">
+              <a:solidFill>
+                <a:srgbClr val="02A9F7"/>
+              </a:solidFill>
+            </a:endParaRPr>
+          </a:p>
+        </p:txBody>
+      </p:sp>
+      <p:pic>
+        <p:nvPicPr>
+          <p:cNvPr id="3" name="Picture 2"/>
+          <p:cNvPicPr>
+            <a:picLocks noChangeAspect="1"/>
+          </p:cNvPicPr>
+          <p:nvPr/>
+        </p:nvPicPr>
+        <p:blipFill>
+          <a:blip r:embed="rId3"/>
+          <a:stretch>
+            <a:fillRect/>
+          </a:stretch>
+        </p:blipFill>
+        <p:spPr>
+          <a:xfrm>
+            <a:off x="1600200" y="3200400"/>
+            <a:ext cx="8458200" cy="2755900"/>
+          </a:xfrm>
+          <a:prstGeom prst="rect">
+            <a:avLst/>
+          </a:prstGeom>
+        </p:spPr>
+      </p:pic>
+      <p:pic>
+        <p:nvPicPr>
+          <p:cNvPr id="4" name="Picture 3"/>
+          <p:cNvPicPr>
+            <a:picLocks noChangeAspect="1"/>
+          </p:cNvPicPr>
+          <p:nvPr/>
+        </p:nvPicPr>
+        <p:blipFill rotWithShape="1">
+          <a:blip r:embed="rId4"/>
+          <a:srcRect t="13135" b="17097"/>
+          <a:stretch/>
+        </p:blipFill>
+        <p:spPr>
+          <a:xfrm>
+            <a:off x="2209800" y="2438400"/>
+            <a:ext cx="8735595" cy="250103"/>
+          </a:xfrm>
+          <a:prstGeom prst="rect">
+            <a:avLst/>
+          </a:prstGeom>
+        </p:spPr>
+      </p:pic>
+    </p:spTree>
+    <p:extLst>
+      <p:ext uri="{BB962C8B-B14F-4D97-AF65-F5344CB8AC3E}">
+        <p14:creationId xmlns:p14="http://schemas.microsoft.com/office/powerpoint/2010/main" val="533893097"/>
+      </p:ext>
+    </p:extLst>
+  </p:cSld>
+  <p:clrMapOvr>
+    <a:masterClrMapping/>
+  </p:clrMapOvr>
+</p:sld>
+</file>
+
+<file path=ppt/slides/slide12.xml><?xml version="1.0" encoding="utf-8"?>
+<p:sld xmlns:a="http://schemas.openxmlformats.org/drawingml/2006/main" xmlns:r="http://schemas.openxmlformats.org/officeDocument/2006/relationships" xmlns:p="http://schemas.openxmlformats.org/presentationml/2006/main">
+  <p:cSld>
+    <p:spTree>
+      <p:nvGrpSpPr>
+        <p:cNvPr id="1" name=""/>
+        <p:cNvGrpSpPr/>
+        <p:nvPr/>
+      </p:nvGrpSpPr>
+      <p:grpSpPr>
+        <a:xfrm>
+          <a:off x="0" y="0"/>
+          <a:ext cx="0" cy="0"/>
+          <a:chOff x="0" y="0"/>
+          <a:chExt cx="0" cy="0"/>
+        </a:xfrm>
+      </p:grpSpPr>
+      <p:sp>
+        <p:nvSpPr>
+          <p:cNvPr id="2" name="Content Placeholder 1"/>
+          <p:cNvSpPr>
+            <a:spLocks noGrp="1"/>
+          </p:cNvSpPr>
+          <p:nvPr>
+            <p:ph sz="quarter" idx="10"/>
+          </p:nvPr>
+        </p:nvSpPr>
+        <p:spPr>
+          <a:xfrm>
+            <a:off x="838200" y="685801"/>
+            <a:ext cx="10515600" cy="609599"/>
+          </a:xfrm>
+        </p:spPr>
+        <p:txBody>
+          <a:bodyPr/>
+          <a:lstStyle/>
+          <a:p>
+            <a:r>
+              <a:rPr lang="en-US" dirty="0" smtClean="0"/>
+              <a:t>WHAT IS JAVA FUTURE?</a:t>
+            </a:r>
+            <a:endParaRPr lang="en-US" dirty="0"/>
+          </a:p>
+        </p:txBody>
+      </p:sp>
+      <p:pic>
+        <p:nvPicPr>
+          <p:cNvPr id="7" name="Picture 6"/>
+          <p:cNvPicPr>
+            <a:picLocks noChangeAspect="1"/>
+          </p:cNvPicPr>
+          <p:nvPr/>
+        </p:nvPicPr>
+        <p:blipFill>
+          <a:blip r:embed="rId3"/>
+          <a:stretch>
+            <a:fillRect/>
+          </a:stretch>
+        </p:blipFill>
+        <p:spPr>
+          <a:xfrm>
+            <a:off x="1308100" y="1295400"/>
+            <a:ext cx="3733800" cy="3180271"/>
+          </a:xfrm>
+          <a:prstGeom prst="rect">
+            <a:avLst/>
+          </a:prstGeom>
+        </p:spPr>
+      </p:pic>
+      <p:pic>
+        <p:nvPicPr>
+          <p:cNvPr id="8" name="Picture 7"/>
+          <p:cNvPicPr>
+            <a:picLocks noChangeAspect="1"/>
+          </p:cNvPicPr>
+          <p:nvPr/>
+        </p:nvPicPr>
+        <p:blipFill>
+          <a:blip r:embed="rId4"/>
+          <a:stretch>
+            <a:fillRect/>
+          </a:stretch>
+        </p:blipFill>
+        <p:spPr>
+          <a:xfrm>
+            <a:off x="7543800" y="1252080"/>
+            <a:ext cx="3609036" cy="3251200"/>
+          </a:xfrm>
+          <a:prstGeom prst="rect">
+            <a:avLst/>
+          </a:prstGeom>
+        </p:spPr>
+      </p:pic>
+      <p:sp>
+        <p:nvSpPr>
+          <p:cNvPr id="9" name="TextBox 8"/>
+          <p:cNvSpPr txBox="1"/>
+          <p:nvPr/>
+        </p:nvSpPr>
+        <p:spPr>
+          <a:xfrm>
+            <a:off x="0" y="0"/>
+            <a:ext cx="3886200" cy="461665"/>
+          </a:xfrm>
+          <a:prstGeom prst="rect">
+            <a:avLst/>
+          </a:prstGeom>
+          <a:noFill/>
+        </p:spPr>
+        <p:txBody>
+          <a:bodyPr wrap="square" rtlCol="0">
+            <a:spAutoFit/>
+          </a:bodyPr>
+          <a:lstStyle/>
+          <a:p>
+            <a:r>
+              <a:rPr lang="en-US" sz="2400" i="1" dirty="0" smtClean="0">
+                <a:solidFill>
+                  <a:srgbClr val="02A9F7"/>
+                </a:solidFill>
+              </a:rPr>
+              <a:t>JAVA FUTURE</a:t>
+            </a:r>
+            <a:endParaRPr lang="en-US" sz="2400" i="1" dirty="0">
+              <a:solidFill>
+                <a:srgbClr val="02A9F7"/>
+              </a:solidFill>
+            </a:endParaRPr>
+          </a:p>
+        </p:txBody>
+      </p:sp>
+      <p:pic>
+        <p:nvPicPr>
+          <p:cNvPr id="10" name="Picture 9"/>
+          <p:cNvPicPr>
+            <a:picLocks noChangeAspect="1"/>
+          </p:cNvPicPr>
+          <p:nvPr/>
+        </p:nvPicPr>
+        <p:blipFill rotWithShape="1">
+          <a:blip r:embed="rId5"/>
+          <a:srcRect/>
+          <a:stretch/>
+        </p:blipFill>
+        <p:spPr>
+          <a:xfrm>
+            <a:off x="381000" y="4648200"/>
+            <a:ext cx="5588000" cy="1841500"/>
+          </a:xfrm>
+          <a:prstGeom prst="rect">
+            <a:avLst/>
+          </a:prstGeom>
+        </p:spPr>
+      </p:pic>
+      <p:pic>
+        <p:nvPicPr>
+          <p:cNvPr id="11" name="Picture 10"/>
+          <p:cNvPicPr>
+            <a:picLocks noChangeAspect="1"/>
+          </p:cNvPicPr>
+          <p:nvPr/>
+        </p:nvPicPr>
+        <p:blipFill>
+          <a:blip r:embed="rId6"/>
+          <a:stretch>
+            <a:fillRect/>
+          </a:stretch>
+        </p:blipFill>
+        <p:spPr>
+          <a:xfrm>
+            <a:off x="6890868" y="4612341"/>
+            <a:ext cx="4914900" cy="1701800"/>
+          </a:xfrm>
+          <a:prstGeom prst="rect">
+            <a:avLst/>
+          </a:prstGeom>
+        </p:spPr>
+      </p:pic>
+    </p:spTree>
+    <p:extLst>
+      <p:ext uri="{BB962C8B-B14F-4D97-AF65-F5344CB8AC3E}">
+        <p14:creationId xmlns:p14="http://schemas.microsoft.com/office/powerpoint/2010/main" val="324554880"/>
+      </p:ext>
+    </p:extLst>
+  </p:cSld>
+  <p:clrMapOvr>
+    <a:masterClrMapping/>
+  </p:clrMapOvr>
+</p:sld>
+</file>
+
+<file path=ppt/slides/slide13.xml><?xml version="1.0" encoding="utf-8"?>
+<p:sld xmlns:a="http://schemas.openxmlformats.org/drawingml/2006/main" xmlns:r="http://schemas.openxmlformats.org/officeDocument/2006/relationships" xmlns:p="http://schemas.openxmlformats.org/presentationml/2006/main">
+  <p:cSld>
+    <p:spTree>
+      <p:nvGrpSpPr>
+        <p:cNvPr id="1" name=""/>
+        <p:cNvGrpSpPr/>
+        <p:nvPr/>
+      </p:nvGrpSpPr>
+      <p:grpSpPr>
+        <a:xfrm>
+          <a:off x="0" y="0"/>
+          <a:ext cx="0" cy="0"/>
+          <a:chOff x="0" y="0"/>
+          <a:chExt cx="0" cy="0"/>
+        </a:xfrm>
+      </p:grpSpPr>
+      <p:sp>
+        <p:nvSpPr>
+          <p:cNvPr id="2" name="Content Placeholder 1"/>
+          <p:cNvSpPr>
+            <a:spLocks noGrp="1"/>
+          </p:cNvSpPr>
+          <p:nvPr>
+            <p:ph sz="quarter" idx="10"/>
+          </p:nvPr>
+        </p:nvSpPr>
+        <p:spPr>
+          <a:xfrm>
+            <a:off x="838200" y="685801"/>
+            <a:ext cx="10515600" cy="609599"/>
+          </a:xfrm>
+        </p:spPr>
+        <p:txBody>
+          <a:bodyPr/>
+          <a:lstStyle/>
+          <a:p>
+            <a:r>
+              <a:rPr lang="en-US" dirty="0" smtClean="0"/>
+              <a:t>ANYTHING ELSE?</a:t>
+            </a:r>
+            <a:endParaRPr lang="en-US" dirty="0"/>
+          </a:p>
+        </p:txBody>
+      </p:sp>
+      <p:sp>
+        <p:nvSpPr>
+          <p:cNvPr id="9" name="TextBox 8"/>
+          <p:cNvSpPr txBox="1"/>
+          <p:nvPr/>
+        </p:nvSpPr>
+        <p:spPr>
+          <a:xfrm>
+            <a:off x="0" y="0"/>
+            <a:ext cx="3886200" cy="461665"/>
+          </a:xfrm>
+          <a:prstGeom prst="rect">
+            <a:avLst/>
+          </a:prstGeom>
+          <a:noFill/>
+        </p:spPr>
+        <p:txBody>
+          <a:bodyPr wrap="square" rtlCol="0">
+            <a:spAutoFit/>
+          </a:bodyPr>
+          <a:lstStyle/>
+          <a:p>
+            <a:r>
+              <a:rPr lang="en-US" sz="2400" i="1" dirty="0" smtClean="0">
+                <a:solidFill>
+                  <a:srgbClr val="02A9F7"/>
+                </a:solidFill>
+              </a:rPr>
+              <a:t>JAVA FUTURE</a:t>
+            </a:r>
+            <a:endParaRPr lang="en-US" sz="2400" i="1" dirty="0">
+              <a:solidFill>
+                <a:srgbClr val="02A9F7"/>
+              </a:solidFill>
+            </a:endParaRPr>
+          </a:p>
+        </p:txBody>
+      </p:sp>
+      <p:sp>
+        <p:nvSpPr>
+          <p:cNvPr id="3" name="Rectangle 2"/>
+          <p:cNvSpPr/>
+          <p:nvPr/>
+        </p:nvSpPr>
+        <p:spPr>
+          <a:xfrm>
+            <a:off x="838200" y="1519536"/>
+            <a:ext cx="4876800" cy="369332"/>
+          </a:xfrm>
+          <a:prstGeom prst="rect">
+            <a:avLst/>
+          </a:prstGeom>
+        </p:spPr>
+        <p:txBody>
+          <a:bodyPr wrap="square">
+            <a:spAutoFit/>
+          </a:bodyPr>
+          <a:lstStyle/>
+          <a:p>
+            <a:r>
+              <a:rPr lang="en-US" b="1" dirty="0" err="1">
+                <a:solidFill>
+                  <a:srgbClr val="555555"/>
+                </a:solidFill>
+                <a:latin typeface="Lora" charset="0"/>
+              </a:rPr>
+              <a:t>invokeAll</a:t>
+            </a:r>
+            <a:r>
+              <a:rPr lang="en-US" b="1" dirty="0" smtClean="0">
+                <a:solidFill>
+                  <a:srgbClr val="555555"/>
+                </a:solidFill>
+                <a:latin typeface="Lora" charset="0"/>
+              </a:rPr>
+              <a:t>(): Start all tasks same time</a:t>
+            </a:r>
+            <a:endParaRPr lang="en-US" dirty="0"/>
+          </a:p>
+        </p:txBody>
+      </p:sp>
+      <p:sp>
+        <p:nvSpPr>
+          <p:cNvPr id="5" name="Rectangle 4"/>
+          <p:cNvSpPr/>
+          <p:nvPr/>
+        </p:nvSpPr>
+        <p:spPr>
+          <a:xfrm>
+            <a:off x="838200" y="1928338"/>
+            <a:ext cx="3397084" cy="369332"/>
+          </a:xfrm>
+          <a:prstGeom prst="rect">
+            <a:avLst/>
+          </a:prstGeom>
+        </p:spPr>
+        <p:txBody>
+          <a:bodyPr wrap="none">
+            <a:spAutoFit/>
+          </a:bodyPr>
+          <a:lstStyle/>
+          <a:p>
+            <a:r>
+              <a:rPr lang="en-US" b="1" i="1" dirty="0" err="1">
+                <a:solidFill>
+                  <a:srgbClr val="333333"/>
+                </a:solidFill>
+                <a:latin typeface="raleway" charset="0"/>
+              </a:rPr>
+              <a:t>isDone</a:t>
+            </a:r>
+            <a:r>
+              <a:rPr lang="en-US" b="1" i="1" dirty="0" smtClean="0">
+                <a:solidFill>
+                  <a:srgbClr val="333333"/>
+                </a:solidFill>
+                <a:latin typeface="raleway" charset="0"/>
+              </a:rPr>
+              <a:t>(): Check a task is finished</a:t>
+            </a:r>
+            <a:endParaRPr lang="en-US" b="1" i="0" u="none" strike="noStrike" dirty="0">
+              <a:solidFill>
+                <a:srgbClr val="333333"/>
+              </a:solidFill>
+              <a:effectLst/>
+              <a:latin typeface="raleway" charset="0"/>
+            </a:endParaRPr>
+          </a:p>
+        </p:txBody>
+      </p:sp>
+      <p:sp>
+        <p:nvSpPr>
+          <p:cNvPr id="6" name="Rectangle 5"/>
+          <p:cNvSpPr/>
+          <p:nvPr/>
+        </p:nvSpPr>
+        <p:spPr>
+          <a:xfrm>
+            <a:off x="820271" y="2337140"/>
+            <a:ext cx="5218095" cy="369332"/>
+          </a:xfrm>
+          <a:prstGeom prst="rect">
+            <a:avLst/>
+          </a:prstGeom>
+        </p:spPr>
+        <p:txBody>
+          <a:bodyPr wrap="none">
+            <a:spAutoFit/>
+          </a:bodyPr>
+          <a:lstStyle/>
+          <a:p>
+            <a:r>
+              <a:rPr lang="mr-IN" b="1" i="1" dirty="0" err="1" smtClean="0">
+                <a:solidFill>
+                  <a:srgbClr val="333333"/>
+                </a:solidFill>
+                <a:latin typeface="raleway" charset="0"/>
+              </a:rPr>
+              <a:t>get</a:t>
+            </a:r>
+            <a:r>
+              <a:rPr lang="mr-IN" b="1" i="1" dirty="0" smtClean="0">
+                <a:solidFill>
+                  <a:srgbClr val="333333"/>
+                </a:solidFill>
+                <a:latin typeface="raleway" charset="0"/>
+              </a:rPr>
+              <a:t>(</a:t>
+            </a:r>
+            <a:r>
+              <a:rPr lang="en-US" b="1" i="1" dirty="0" smtClean="0">
+                <a:solidFill>
+                  <a:srgbClr val="333333"/>
+                </a:solidFill>
+                <a:latin typeface="raleway" charset="0"/>
+              </a:rPr>
+              <a:t>timeout,</a:t>
+            </a:r>
+            <a:r>
+              <a:rPr lang="en-US" b="1" dirty="0"/>
+              <a:t> unit</a:t>
+            </a:r>
+            <a:r>
+              <a:rPr lang="en-US" b="1" i="1" dirty="0" smtClean="0">
+                <a:solidFill>
+                  <a:srgbClr val="333333"/>
+                </a:solidFill>
+                <a:latin typeface="raleway" charset="0"/>
+              </a:rPr>
+              <a:t> </a:t>
+            </a:r>
+            <a:r>
+              <a:rPr lang="mr-IN" b="1" i="1" dirty="0" smtClean="0">
+                <a:solidFill>
+                  <a:srgbClr val="333333"/>
+                </a:solidFill>
+                <a:latin typeface="raleway" charset="0"/>
+              </a:rPr>
+              <a:t>)</a:t>
+            </a:r>
+            <a:r>
+              <a:rPr lang="en-US" b="1" i="1" dirty="0" smtClean="0">
+                <a:solidFill>
+                  <a:srgbClr val="333333"/>
+                </a:solidFill>
+                <a:latin typeface="raleway" charset="0"/>
+              </a:rPr>
+              <a:t> : Get return value in limit of time </a:t>
+            </a:r>
+            <a:endParaRPr lang="mr-IN" b="1" i="0" u="none" strike="noStrike" dirty="0">
+              <a:solidFill>
+                <a:srgbClr val="333333"/>
+              </a:solidFill>
+              <a:effectLst/>
+              <a:latin typeface="raleway" charset="0"/>
+            </a:endParaRPr>
+          </a:p>
+        </p:txBody>
+      </p:sp>
+      <p:sp>
+        <p:nvSpPr>
+          <p:cNvPr id="10" name="Rectangle 9"/>
+          <p:cNvSpPr/>
+          <p:nvPr/>
+        </p:nvSpPr>
+        <p:spPr>
+          <a:xfrm>
+            <a:off x="820270" y="2745942"/>
+            <a:ext cx="1202380" cy="369332"/>
+          </a:xfrm>
+          <a:prstGeom prst="rect">
+            <a:avLst/>
+          </a:prstGeom>
+        </p:spPr>
+        <p:txBody>
+          <a:bodyPr wrap="none">
+            <a:spAutoFit/>
+          </a:bodyPr>
+          <a:lstStyle/>
+          <a:p>
+            <a:r>
+              <a:rPr lang="en-US" b="1" i="1" dirty="0" err="1" smtClean="0">
+                <a:solidFill>
+                  <a:srgbClr val="333333"/>
+                </a:solidFill>
+                <a:latin typeface="raleway" charset="0"/>
+              </a:rPr>
+              <a:t>isTerminal</a:t>
+            </a:r>
+            <a:endParaRPr lang="mr-IN" b="1" i="0" u="none" strike="noStrike" dirty="0">
+              <a:solidFill>
+                <a:srgbClr val="333333"/>
+              </a:solidFill>
+              <a:effectLst/>
+              <a:latin typeface="raleway" charset="0"/>
+            </a:endParaRPr>
+          </a:p>
+        </p:txBody>
+      </p:sp>
+      <p:sp>
+        <p:nvSpPr>
+          <p:cNvPr id="11" name="Rectangle 10"/>
+          <p:cNvSpPr/>
+          <p:nvPr/>
+        </p:nvSpPr>
+        <p:spPr>
+          <a:xfrm>
+            <a:off x="838200" y="3153926"/>
+            <a:ext cx="954107" cy="369332"/>
+          </a:xfrm>
+          <a:prstGeom prst="rect">
+            <a:avLst/>
+          </a:prstGeom>
+        </p:spPr>
+        <p:txBody>
+          <a:bodyPr wrap="none">
+            <a:spAutoFit/>
+          </a:bodyPr>
+          <a:lstStyle/>
+          <a:p>
+            <a:r>
+              <a:rPr lang="en-US" b="1" i="1" dirty="0">
+                <a:solidFill>
+                  <a:srgbClr val="333333"/>
+                </a:solidFill>
+                <a:latin typeface="raleway" charset="0"/>
+              </a:rPr>
+              <a:t>c</a:t>
+            </a:r>
+            <a:r>
+              <a:rPr lang="en-US" b="1" i="1" dirty="0" smtClean="0">
+                <a:solidFill>
+                  <a:srgbClr val="333333"/>
+                </a:solidFill>
+                <a:latin typeface="raleway" charset="0"/>
+              </a:rPr>
+              <a:t>ancel()</a:t>
+            </a:r>
+            <a:endParaRPr lang="mr-IN" b="1" i="0" u="none" strike="noStrike" dirty="0">
+              <a:solidFill>
+                <a:srgbClr val="333333"/>
+              </a:solidFill>
+              <a:effectLst/>
+              <a:latin typeface="raleway" charset="0"/>
+            </a:endParaRPr>
+          </a:p>
+        </p:txBody>
+      </p:sp>
+      <p:sp>
+        <p:nvSpPr>
+          <p:cNvPr id="12" name="Rectangle 11"/>
+          <p:cNvSpPr/>
+          <p:nvPr/>
+        </p:nvSpPr>
+        <p:spPr>
+          <a:xfrm>
+            <a:off x="820270" y="3561910"/>
+            <a:ext cx="1159292" cy="369332"/>
+          </a:xfrm>
+          <a:prstGeom prst="rect">
+            <a:avLst/>
+          </a:prstGeom>
+        </p:spPr>
+        <p:txBody>
+          <a:bodyPr wrap="none">
+            <a:spAutoFit/>
+          </a:bodyPr>
+          <a:lstStyle/>
+          <a:p>
+            <a:r>
+              <a:rPr lang="en-US" b="1" i="1" dirty="0" err="1" smtClean="0">
+                <a:solidFill>
+                  <a:srgbClr val="333333"/>
+                </a:solidFill>
+                <a:latin typeface="raleway" charset="0"/>
+              </a:rPr>
+              <a:t>isCancel</a:t>
+            </a:r>
+            <a:r>
+              <a:rPr lang="en-US" b="1" i="1" dirty="0" smtClean="0">
+                <a:solidFill>
+                  <a:srgbClr val="333333"/>
+                </a:solidFill>
+                <a:latin typeface="raleway" charset="0"/>
+              </a:rPr>
+              <a:t>()</a:t>
+            </a:r>
+            <a:endParaRPr lang="mr-IN" b="1" i="0" u="none" strike="noStrike" dirty="0">
+              <a:solidFill>
+                <a:srgbClr val="333333"/>
+              </a:solidFill>
+              <a:effectLst/>
+              <a:latin typeface="raleway" charset="0"/>
+            </a:endParaRPr>
+          </a:p>
+        </p:txBody>
+      </p:sp>
+      <p:pic>
+        <p:nvPicPr>
+          <p:cNvPr id="16" name="Picture 15"/>
+          <p:cNvPicPr>
+            <a:picLocks noChangeAspect="1"/>
+          </p:cNvPicPr>
+          <p:nvPr/>
+        </p:nvPicPr>
+        <p:blipFill>
+          <a:blip r:embed="rId3"/>
+          <a:stretch>
+            <a:fillRect/>
+          </a:stretch>
+        </p:blipFill>
+        <p:spPr>
+          <a:xfrm>
+            <a:off x="6096000" y="894630"/>
+            <a:ext cx="5791200" cy="4441288"/>
+          </a:xfrm>
+          <a:prstGeom prst="rect">
+            <a:avLst/>
+          </a:prstGeom>
+        </p:spPr>
+      </p:pic>
+    </p:spTree>
+    <p:extLst>
+      <p:ext uri="{BB962C8B-B14F-4D97-AF65-F5344CB8AC3E}">
+        <p14:creationId xmlns:p14="http://schemas.microsoft.com/office/powerpoint/2010/main" val="1939280394"/>
+      </p:ext>
+    </p:extLst>
+  </p:cSld>
+  <p:clrMapOvr>
+    <a:masterClrMapping/>
+  </p:clrMapOvr>
+</p:sld>
+</file>
+
+<file path=ppt/slides/slide14.xml><?xml version="1.0" encoding="utf-8"?>
+<p:sld xmlns:a="http://schemas.openxmlformats.org/drawingml/2006/main" xmlns:r="http://schemas.openxmlformats.org/officeDocument/2006/relationships" xmlns:p="http://schemas.openxmlformats.org/presentationml/2006/main">
+  <p:cSld>
+    <p:spTree>
+      <p:nvGrpSpPr>
+        <p:cNvPr id="1" name=""/>
+        <p:cNvGrpSpPr/>
+        <p:nvPr/>
+      </p:nvGrpSpPr>
+      <p:grpSpPr>
+        <a:xfrm>
+          <a:off x="0" y="0"/>
+          <a:ext cx="0" cy="0"/>
+          <a:chOff x="0" y="0"/>
+          <a:chExt cx="0" cy="0"/>
+        </a:xfrm>
+      </p:grpSpPr>
+      <p:grpSp>
+        <p:nvGrpSpPr>
+          <p:cNvPr id="2" name="Group 1"/>
+          <p:cNvGrpSpPr/>
+          <p:nvPr/>
+        </p:nvGrpSpPr>
+        <p:grpSpPr>
+          <a:xfrm>
+            <a:off x="6096000" y="1326292"/>
+            <a:ext cx="5244353" cy="3657599"/>
+            <a:chOff x="6109447" y="685801"/>
+            <a:chExt cx="4681440" cy="3200400"/>
+          </a:xfrm>
+        </p:grpSpPr>
+        <p:pic>
+          <p:nvPicPr>
+            <p:cNvPr id="4" name="Picture 3"/>
+            <p:cNvPicPr>
+              <a:picLocks noChangeAspect="1"/>
+            </p:cNvPicPr>
+            <p:nvPr/>
+          </p:nvPicPr>
+          <p:blipFill rotWithShape="1">
+            <a:blip r:embed="rId2"/>
+            <a:srcRect r="61868" b="36962"/>
+            <a:stretch/>
+          </p:blipFill>
+          <p:spPr>
+            <a:xfrm>
+              <a:off x="6109447" y="685801"/>
+              <a:ext cx="2155661" cy="3200399"/>
+            </a:xfrm>
+            <a:prstGeom prst="rect">
+              <a:avLst/>
+            </a:prstGeom>
+          </p:spPr>
+        </p:pic>
+        <p:pic>
+          <p:nvPicPr>
+            <p:cNvPr id="5" name="Picture 4"/>
+            <p:cNvPicPr>
+              <a:picLocks noChangeAspect="1"/>
+            </p:cNvPicPr>
+            <p:nvPr/>
+          </p:nvPicPr>
+          <p:blipFill rotWithShape="1">
+            <a:blip r:embed="rId2"/>
+            <a:srcRect l="54411" b="36570"/>
+            <a:stretch/>
+          </p:blipFill>
+          <p:spPr>
+            <a:xfrm>
+              <a:off x="8229600" y="685801"/>
+              <a:ext cx="2561287" cy="3200400"/>
+            </a:xfrm>
+            <a:prstGeom prst="rect">
+              <a:avLst/>
+            </a:prstGeom>
+          </p:spPr>
+        </p:pic>
+      </p:grpSp>
+      <p:pic>
+        <p:nvPicPr>
+          <p:cNvPr id="7" name="Picture 6"/>
+          <p:cNvPicPr>
+            <a:picLocks noChangeAspect="1"/>
+          </p:cNvPicPr>
+          <p:nvPr/>
+        </p:nvPicPr>
+        <p:blipFill>
+          <a:blip r:embed="rId3"/>
+          <a:stretch>
+            <a:fillRect/>
+          </a:stretch>
+        </p:blipFill>
+        <p:spPr>
+          <a:xfrm>
+            <a:off x="685800" y="2252730"/>
+            <a:ext cx="4775200" cy="723900"/>
+          </a:xfrm>
+          <a:prstGeom prst="rect">
+            <a:avLst/>
+          </a:prstGeom>
+        </p:spPr>
+      </p:pic>
+      <p:sp>
+        <p:nvSpPr>
+          <p:cNvPr id="8" name="TextBox 7"/>
+          <p:cNvSpPr txBox="1"/>
+          <p:nvPr/>
+        </p:nvSpPr>
+        <p:spPr>
+          <a:xfrm>
+            <a:off x="0" y="0"/>
+            <a:ext cx="3886200" cy="461665"/>
+          </a:xfrm>
+          <a:prstGeom prst="rect">
+            <a:avLst/>
+          </a:prstGeom>
+          <a:noFill/>
+        </p:spPr>
+        <p:txBody>
+          <a:bodyPr wrap="square" rtlCol="0">
+            <a:spAutoFit/>
+          </a:bodyPr>
+          <a:lstStyle/>
+          <a:p>
+            <a:r>
+              <a:rPr lang="en-US" sz="2400" i="1" dirty="0" smtClean="0">
+                <a:solidFill>
+                  <a:srgbClr val="02A9F7"/>
+                </a:solidFill>
+              </a:rPr>
+              <a:t>JAVA FUTURE</a:t>
+            </a:r>
+            <a:endParaRPr lang="en-US" sz="2400" i="1" dirty="0">
+              <a:solidFill>
+                <a:srgbClr val="02A9F7"/>
+              </a:solidFill>
+            </a:endParaRPr>
+          </a:p>
+        </p:txBody>
+      </p:sp>
+      <p:sp>
+        <p:nvSpPr>
+          <p:cNvPr id="9" name="Content Placeholder 1"/>
+          <p:cNvSpPr>
+            <a:spLocks noGrp="1"/>
+          </p:cNvSpPr>
+          <p:nvPr>
+            <p:ph sz="quarter" idx="10"/>
+          </p:nvPr>
+        </p:nvSpPr>
+        <p:spPr>
+          <a:xfrm>
+            <a:off x="838200" y="685801"/>
+            <a:ext cx="10515600" cy="609599"/>
+          </a:xfrm>
+        </p:spPr>
+        <p:txBody>
+          <a:bodyPr/>
+          <a:lstStyle/>
+          <a:p>
+            <a:r>
+              <a:rPr lang="en-US" dirty="0" smtClean="0"/>
+              <a:t>COMPLETABLE </a:t>
+            </a:r>
+            <a:r>
+              <a:rPr lang="en-US" dirty="0" smtClean="0"/>
+              <a:t>FUTURE</a:t>
+            </a:r>
+            <a:endParaRPr lang="en-US" dirty="0"/>
+          </a:p>
+        </p:txBody>
+      </p:sp>
+    </p:spTree>
+    <p:extLst>
+      <p:ext uri="{BB962C8B-B14F-4D97-AF65-F5344CB8AC3E}">
+        <p14:creationId xmlns:p14="http://schemas.microsoft.com/office/powerpoint/2010/main" val="331349001"/>
+      </p:ext>
+    </p:extLst>
+  </p:cSld>
+  <p:clrMapOvr>
+    <a:masterClrMapping/>
+  </p:clrMapOvr>
+</p:sld>
+</file>
+
 <file path=ppt/slides/slide2.xml><?xml version="1.0" encoding="utf-8"?>
 <p:sld xmlns:a="http://schemas.openxmlformats.org/drawingml/2006/main" xmlns:r="http://schemas.openxmlformats.org/officeDocument/2006/relationships" xmlns:p="http://schemas.openxmlformats.org/presentationml/2006/main">
   <p:cSld>
@@ -2920,7 +4209,7 @@
           <p:cNvPr id="4" name="Content Placeholder 3">
             <a:extLst>
               <a:ext uri="{FF2B5EF4-FFF2-40B4-BE49-F238E27FC236}">
-                <a16:creationId xmlns:a16="http://schemas.microsoft.com/office/drawing/2014/main" id="{E7F70646-303D-462C-B3D5-15197E9DB505}"/>
+                <a16:creationId xmlns="" xmlns:a16="http://schemas.microsoft.com/office/drawing/2014/main" id="{E7F70646-303D-462C-B3D5-15197E9DB505}"/>
               </a:ext>
             </a:extLst>
           </p:cNvPr>
@@ -2949,7 +4238,7 @@
           <p:cNvPr id="5" name="Text Placeholder 4">
             <a:extLst>
               <a:ext uri="{FF2B5EF4-FFF2-40B4-BE49-F238E27FC236}">
-                <a16:creationId xmlns:a16="http://schemas.microsoft.com/office/drawing/2014/main" id="{54B04121-0DE3-48F2-A382-8E050791BB2A}"/>
+                <a16:creationId xmlns="" xmlns:a16="http://schemas.microsoft.com/office/drawing/2014/main" id="{54B04121-0DE3-48F2-A382-8E050791BB2A}"/>
               </a:ext>
             </a:extLst>
           </p:cNvPr>
@@ -3586,13 +4875,8 @@
           <a:p>
             <a:r>
               <a:rPr lang="en-US" sz="2400" dirty="0" smtClean="0"/>
-              <a:t>Backward </a:t>
-            </a:r>
-            <a:r>
-              <a:rPr lang="en-US" sz="2400" dirty="0" smtClean="0"/>
-              <a:t>compatible (aka: not breaking existing clients)</a:t>
-            </a:r>
-            <a:endParaRPr lang="en-US" sz="2400" dirty="0" smtClean="0"/>
+              <a:t>Backward compatible (aka: not breaking existing clients)</a:t>
+            </a:r>
           </a:p>
           <a:p>
             <a:r>

</xml_diff>